<commit_message>
added competitors to ppt
</commit_message>
<xml_diff>
--- a/InceptionProject.pptx
+++ b/InceptionProject.pptx
@@ -116,6 +116,22 @@
       </a:defRPr>
     </a:lvl9pPr>
   </p:defaultTextStyle>
+  <p:extLst>
+    <p:ext uri="{EFAFB233-063F-42B5-8137-9DF3F51BA10A}">
+      <p15:sldGuideLst xmlns:p15="http://schemas.microsoft.com/office/powerpoint/2012/main">
+        <p15:guide id="1" orient="horz" pos="2160">
+          <p15:clr>
+            <a:srgbClr val="A4A3A4"/>
+          </p15:clr>
+        </p15:guide>
+        <p15:guide id="2" pos="2880">
+          <p15:clr>
+            <a:srgbClr val="A4A3A4"/>
+          </p15:clr>
+        </p15:guide>
+      </p15:sldGuideLst>
+    </p:ext>
+  </p:extLst>
 </p:presentation>
 </file>
 
@@ -408,7 +424,7 @@
           <a:p>
             <a:fld id="{B1115196-1C6F-4784-83AC-30756D8F10B3}" type="datetimeFigureOut">
               <a:rPr lang="en-US" smtClean="0"/>
-              <a:t>9/8/18</a:t>
+              <a:t>9/9/18</a:t>
             </a:fld>
             <a:endParaRPr lang="en-US"/>
           </a:p>
@@ -569,7 +585,7 @@
           </a:lstStyle>
           <a:p>
             <a:r>
-              <a:rPr lang="en-US" smtClean="0"/>
+              <a:rPr lang="en-US"/>
               <a:t>Click to edit Master title style</a:t>
             </a:r>
             <a:endParaRPr/>
@@ -699,7 +715,7 @@
           </a:lstStyle>
           <a:p>
             <a:r>
-              <a:rPr lang="en-US" smtClean="0"/>
+              <a:rPr lang="en-US"/>
               <a:t>Click to edit Master subtitle style</a:t>
             </a:r>
             <a:endParaRPr/>
@@ -763,7 +779,7 @@
           </a:lstStyle>
           <a:p>
             <a:r>
-              <a:rPr lang="en-US" smtClean="0"/>
+              <a:rPr lang="en-US"/>
               <a:t>Drag picture to placeholder or click icon to add</a:t>
             </a:r>
             <a:endParaRPr/>
@@ -795,7 +811,7 @@
           </a:lstStyle>
           <a:p>
             <a:r>
-              <a:rPr lang="en-US" smtClean="0"/>
+              <a:rPr lang="en-US"/>
               <a:t>Click to edit Master title style</a:t>
             </a:r>
             <a:endParaRPr/>
@@ -864,7 +880,7 @@
           <a:p>
             <a:pPr lvl="0"/>
             <a:r>
-              <a:rPr lang="en-US" smtClean="0"/>
+              <a:rPr lang="en-US"/>
               <a:t>Click to edit Master text styles</a:t>
             </a:r>
           </a:p>
@@ -887,7 +903,7 @@
           <a:p>
             <a:fld id="{B1115196-1C6F-4784-83AC-30756D8F10B3}" type="datetimeFigureOut">
               <a:rPr lang="en-US" smtClean="0"/>
-              <a:t>9/8/18</a:t>
+              <a:t>9/9/18</a:t>
             </a:fld>
             <a:endParaRPr lang="en-US"/>
           </a:p>
@@ -992,7 +1008,7 @@
           </a:lstStyle>
           <a:p>
             <a:r>
-              <a:rPr lang="en-US" smtClean="0"/>
+              <a:rPr lang="en-US"/>
               <a:t>Drag picture to placeholder or click icon to add</a:t>
             </a:r>
             <a:endParaRPr/>
@@ -1024,7 +1040,7 @@
           </a:lstStyle>
           <a:p>
             <a:r>
-              <a:rPr lang="en-US" smtClean="0"/>
+              <a:rPr lang="en-US"/>
               <a:t>Click to edit Master title style</a:t>
             </a:r>
             <a:endParaRPr/>
@@ -1093,7 +1109,7 @@
           <a:p>
             <a:pPr lvl="0"/>
             <a:r>
-              <a:rPr lang="en-US" smtClean="0"/>
+              <a:rPr lang="en-US"/>
               <a:t>Click to edit Master text styles</a:t>
             </a:r>
           </a:p>
@@ -1116,7 +1132,7 @@
           <a:p>
             <a:fld id="{B1115196-1C6F-4784-83AC-30756D8F10B3}" type="datetimeFigureOut">
               <a:rPr lang="en-US" smtClean="0"/>
-              <a:t>9/8/18</a:t>
+              <a:t>9/9/18</a:t>
             </a:fld>
             <a:endParaRPr lang="en-US"/>
           </a:p>
@@ -1222,7 +1238,7 @@
           </a:lstStyle>
           <a:p>
             <a:r>
-              <a:rPr lang="en-US" smtClean="0"/>
+              <a:rPr lang="en-US"/>
               <a:t>Drag picture to placeholder or click icon to add</a:t>
             </a:r>
             <a:endParaRPr/>
@@ -1254,7 +1270,7 @@
           </a:lstStyle>
           <a:p>
             <a:r>
-              <a:rPr lang="en-US" smtClean="0"/>
+              <a:rPr lang="en-US"/>
               <a:t>Click to edit Master title style</a:t>
             </a:r>
             <a:endParaRPr/>
@@ -1323,7 +1339,7 @@
           <a:p>
             <a:pPr lvl="0"/>
             <a:r>
-              <a:rPr lang="en-US" smtClean="0"/>
+              <a:rPr lang="en-US"/>
               <a:t>Click to edit Master text styles</a:t>
             </a:r>
           </a:p>
@@ -1346,7 +1362,7 @@
           <a:p>
             <a:fld id="{B1115196-1C6F-4784-83AC-30756D8F10B3}" type="datetimeFigureOut">
               <a:rPr lang="en-US" smtClean="0"/>
-              <a:t>9/8/18</a:t>
+              <a:t>9/9/18</a:t>
             </a:fld>
             <a:endParaRPr lang="en-US"/>
           </a:p>
@@ -1458,7 +1474,7 @@
           </a:lstStyle>
           <a:p>
             <a:r>
-              <a:rPr lang="en-US" smtClean="0"/>
+              <a:rPr lang="en-US"/>
               <a:t>Drag picture to placeholder or click icon to add</a:t>
             </a:r>
             <a:endParaRPr/>
@@ -1529,7 +1545,7 @@
           </a:lstStyle>
           <a:p>
             <a:r>
-              <a:rPr lang="en-US" smtClean="0"/>
+              <a:rPr lang="en-US"/>
               <a:t>Drag picture to placeholder or click icon to add</a:t>
             </a:r>
             <a:endParaRPr/>
@@ -1586,7 +1602,7 @@
           </a:lstStyle>
           <a:p>
             <a:r>
-              <a:rPr lang="en-US" smtClean="0"/>
+              <a:rPr lang="en-US"/>
               <a:t>Click to edit Master title style</a:t>
             </a:r>
             <a:endParaRPr/>
@@ -1655,7 +1671,7 @@
           <a:p>
             <a:pPr lvl="0"/>
             <a:r>
-              <a:rPr lang="en-US" smtClean="0"/>
+              <a:rPr lang="en-US"/>
               <a:t>Click to edit Master text styles</a:t>
             </a:r>
           </a:p>
@@ -1678,7 +1694,7 @@
           <a:p>
             <a:fld id="{B1115196-1C6F-4784-83AC-30756D8F10B3}" type="datetimeFigureOut">
               <a:rPr lang="en-US" smtClean="0"/>
-              <a:t>9/8/18</a:t>
+              <a:t>9/9/18</a:t>
             </a:fld>
             <a:endParaRPr lang="en-US"/>
           </a:p>
@@ -1772,7 +1788,7 @@
           </a:lstStyle>
           <a:p>
             <a:r>
-              <a:rPr lang="en-US" smtClean="0"/>
+              <a:rPr lang="en-US"/>
               <a:t>Drag picture to placeholder or click icon to add</a:t>
             </a:r>
             <a:endParaRPr/>
@@ -1825,7 +1841,7 @@
           </a:lstStyle>
           <a:p>
             <a:r>
-              <a:rPr lang="en-US" smtClean="0"/>
+              <a:rPr lang="en-US"/>
               <a:t>Drag picture to placeholder or click icon to add</a:t>
             </a:r>
             <a:endParaRPr/>
@@ -1872,7 +1888,7 @@
           </a:lstStyle>
           <a:p>
             <a:r>
-              <a:rPr lang="en-US" smtClean="0"/>
+              <a:rPr lang="en-US"/>
               <a:t>Drag picture to placeholder or click icon to add</a:t>
             </a:r>
             <a:endParaRPr/>
@@ -1919,7 +1935,7 @@
           </a:lstStyle>
           <a:p>
             <a:r>
-              <a:rPr lang="en-US" smtClean="0"/>
+              <a:rPr lang="en-US"/>
               <a:t>Drag picture to placeholder or click icon to add</a:t>
             </a:r>
             <a:endParaRPr/>
@@ -2013,7 +2029,7 @@
           <a:p>
             <a:pPr lvl="0"/>
             <a:r>
-              <a:rPr lang="en-US" smtClean="0"/>
+              <a:rPr lang="en-US"/>
               <a:t>Click to edit Master text styles</a:t>
             </a:r>
           </a:p>
@@ -2036,7 +2052,7 @@
           <a:p>
             <a:fld id="{B1115196-1C6F-4784-83AC-30756D8F10B3}" type="datetimeFigureOut">
               <a:rPr lang="en-US" smtClean="0"/>
-              <a:t>9/8/18</a:t>
+              <a:t>9/9/18</a:t>
             </a:fld>
             <a:endParaRPr lang="en-US"/>
           </a:p>
@@ -2119,7 +2135,7 @@
           </a:lstStyle>
           <a:p>
             <a:r>
-              <a:rPr lang="en-US" smtClean="0"/>
+              <a:rPr lang="en-US"/>
               <a:t>Drag picture to placeholder or click icon to add</a:t>
             </a:r>
             <a:endParaRPr/>
@@ -2173,7 +2189,7 @@
           </a:lstStyle>
           <a:p>
             <a:r>
-              <a:rPr lang="en-US" smtClean="0"/>
+              <a:rPr lang="en-US"/>
               <a:t>Drag picture to placeholder or click icon to add</a:t>
             </a:r>
             <a:endParaRPr/>
@@ -2242,7 +2258,7 @@
           <a:p>
             <a:pPr lvl="0"/>
             <a:r>
-              <a:rPr lang="en-US" smtClean="0"/>
+              <a:rPr lang="en-US"/>
               <a:t>Click to edit Master text styles</a:t>
             </a:r>
           </a:p>
@@ -2319,7 +2335,7 @@
           <a:p>
             <a:pPr lvl="0"/>
             <a:r>
-              <a:rPr lang="en-US" smtClean="0"/>
+              <a:rPr lang="en-US"/>
               <a:t>Click to edit Master text styles</a:t>
             </a:r>
           </a:p>
@@ -2396,7 +2412,7 @@
           <a:p>
             <a:pPr lvl="0"/>
             <a:r>
-              <a:rPr lang="en-US" smtClean="0"/>
+              <a:rPr lang="en-US"/>
               <a:t>Click to edit Master text styles</a:t>
             </a:r>
           </a:p>
@@ -2489,7 +2505,7 @@
           <a:p>
             <a:pPr lvl="0"/>
             <a:r>
-              <a:rPr lang="en-US" smtClean="0"/>
+              <a:rPr lang="en-US"/>
               <a:t>Click to edit Master text styles</a:t>
             </a:r>
           </a:p>
@@ -2512,7 +2528,7 @@
           <a:p>
             <a:fld id="{B1115196-1C6F-4784-83AC-30756D8F10B3}" type="datetimeFigureOut">
               <a:rPr lang="en-US" smtClean="0"/>
-              <a:t>9/8/18</a:t>
+              <a:t>9/9/18</a:t>
             </a:fld>
             <a:endParaRPr lang="en-US"/>
           </a:p>
@@ -2595,7 +2611,7 @@
           </a:lstStyle>
           <a:p>
             <a:r>
-              <a:rPr lang="en-US" smtClean="0"/>
+              <a:rPr lang="en-US"/>
               <a:t>Drag picture to placeholder or click icon to add</a:t>
             </a:r>
             <a:endParaRPr/>
@@ -2649,7 +2665,7 @@
           </a:lstStyle>
           <a:p>
             <a:r>
-              <a:rPr lang="en-US" smtClean="0"/>
+              <a:rPr lang="en-US"/>
               <a:t>Drag picture to placeholder or click icon to add</a:t>
             </a:r>
             <a:endParaRPr/>
@@ -2727,7 +2743,7 @@
           <a:p>
             <a:pPr lvl="0"/>
             <a:r>
-              <a:rPr lang="en-US" smtClean="0"/>
+              <a:rPr lang="en-US"/>
               <a:t>Click to edit Master text styles</a:t>
             </a:r>
           </a:p>
@@ -2765,7 +2781,7 @@
           </a:lstStyle>
           <a:p>
             <a:r>
-              <a:rPr lang="en-US" smtClean="0"/>
+              <a:rPr lang="en-US"/>
               <a:t>Drag picture to placeholder or click icon to add</a:t>
             </a:r>
             <a:endParaRPr/>
@@ -2834,7 +2850,7 @@
           <a:p>
             <a:pPr lvl="0"/>
             <a:r>
-              <a:rPr lang="en-US" smtClean="0"/>
+              <a:rPr lang="en-US"/>
               <a:t>Click to edit Master text styles</a:t>
             </a:r>
           </a:p>
@@ -2911,7 +2927,7 @@
           <a:p>
             <a:pPr lvl="0"/>
             <a:r>
-              <a:rPr lang="en-US" smtClean="0"/>
+              <a:rPr lang="en-US"/>
               <a:t>Click to edit Master text styles</a:t>
             </a:r>
           </a:p>
@@ -2979,7 +2995,7 @@
           <a:p>
             <a:pPr lvl="0"/>
             <a:r>
-              <a:rPr lang="en-US" smtClean="0"/>
+              <a:rPr lang="en-US"/>
               <a:t>Click to edit Master text styles</a:t>
             </a:r>
           </a:p>
@@ -3056,7 +3072,7 @@
           <a:p>
             <a:pPr lvl="0"/>
             <a:r>
-              <a:rPr lang="en-US" smtClean="0"/>
+              <a:rPr lang="en-US"/>
               <a:t>Click to edit Master text styles</a:t>
             </a:r>
           </a:p>
@@ -3108,7 +3124,7 @@
           <a:lstStyle/>
           <a:p>
             <a:r>
-              <a:rPr lang="en-US" smtClean="0"/>
+              <a:rPr lang="en-US"/>
               <a:t>Click to edit Master title style</a:t>
             </a:r>
             <a:endParaRPr/>
@@ -3141,35 +3157,35 @@
           <a:p>
             <a:pPr lvl="0"/>
             <a:r>
-              <a:rPr lang="en-US" smtClean="0"/>
+              <a:rPr lang="en-US"/>
               <a:t>Click to edit Master text styles</a:t>
             </a:r>
           </a:p>
           <a:p>
             <a:pPr lvl="1"/>
             <a:r>
-              <a:rPr lang="en-US" smtClean="0"/>
+              <a:rPr lang="en-US"/>
               <a:t>Second level</a:t>
             </a:r>
           </a:p>
           <a:p>
             <a:pPr lvl="2"/>
             <a:r>
-              <a:rPr lang="en-US" smtClean="0"/>
+              <a:rPr lang="en-US"/>
               <a:t>Third level</a:t>
             </a:r>
           </a:p>
           <a:p>
             <a:pPr lvl="3"/>
             <a:r>
-              <a:rPr lang="en-US" smtClean="0"/>
+              <a:rPr lang="en-US"/>
               <a:t>Fourth level</a:t>
             </a:r>
           </a:p>
           <a:p>
             <a:pPr lvl="4"/>
             <a:r>
-              <a:rPr lang="en-US" smtClean="0"/>
+              <a:rPr lang="en-US"/>
               <a:t>Fifth level</a:t>
             </a:r>
             <a:endParaRPr dirty="0"/>
@@ -3193,7 +3209,7 @@
           <a:p>
             <a:fld id="{B1115196-1C6F-4784-83AC-30756D8F10B3}" type="datetimeFigureOut">
               <a:rPr lang="en-US" smtClean="0"/>
-              <a:t>9/8/18</a:t>
+              <a:t>9/9/18</a:t>
             </a:fld>
             <a:endParaRPr lang="en-US"/>
           </a:p>
@@ -3287,7 +3303,7 @@
           <a:lstStyle/>
           <a:p>
             <a:r>
-              <a:rPr lang="en-US" smtClean="0"/>
+              <a:rPr lang="en-US"/>
               <a:t>Click to edit Master title style</a:t>
             </a:r>
             <a:endParaRPr/>
@@ -3320,35 +3336,35 @@
           <a:p>
             <a:pPr lvl="0"/>
             <a:r>
-              <a:rPr lang="en-US" smtClean="0"/>
+              <a:rPr lang="en-US"/>
               <a:t>Click to edit Master text styles</a:t>
             </a:r>
           </a:p>
           <a:p>
             <a:pPr lvl="1"/>
             <a:r>
-              <a:rPr lang="en-US" smtClean="0"/>
+              <a:rPr lang="en-US"/>
               <a:t>Second level</a:t>
             </a:r>
           </a:p>
           <a:p>
             <a:pPr lvl="2"/>
             <a:r>
-              <a:rPr lang="en-US" smtClean="0"/>
+              <a:rPr lang="en-US"/>
               <a:t>Third level</a:t>
             </a:r>
           </a:p>
           <a:p>
             <a:pPr lvl="3"/>
             <a:r>
-              <a:rPr lang="en-US" smtClean="0"/>
+              <a:rPr lang="en-US"/>
               <a:t>Fourth level</a:t>
             </a:r>
           </a:p>
           <a:p>
             <a:pPr lvl="4"/>
             <a:r>
-              <a:rPr lang="en-US" smtClean="0"/>
+              <a:rPr lang="en-US"/>
               <a:t>Fifth level</a:t>
             </a:r>
             <a:endParaRPr dirty="0"/>
@@ -3372,7 +3388,7 @@
           <a:p>
             <a:fld id="{B1115196-1C6F-4784-83AC-30756D8F10B3}" type="datetimeFigureOut">
               <a:rPr lang="en-US" smtClean="0"/>
-              <a:t>9/8/18</a:t>
+              <a:t>9/9/18</a:t>
             </a:fld>
             <a:endParaRPr lang="en-US"/>
           </a:p>
@@ -3461,7 +3477,7 @@
           <a:lstStyle/>
           <a:p>
             <a:r>
-              <a:rPr lang="en-US" smtClean="0"/>
+              <a:rPr lang="en-US"/>
               <a:t>Click to edit Master title style</a:t>
             </a:r>
             <a:endParaRPr/>
@@ -3491,35 +3507,35 @@
           <a:p>
             <a:pPr lvl="0"/>
             <a:r>
-              <a:rPr lang="en-US" smtClean="0"/>
+              <a:rPr lang="en-US"/>
               <a:t>Click to edit Master text styles</a:t>
             </a:r>
           </a:p>
           <a:p>
             <a:pPr lvl="1"/>
             <a:r>
-              <a:rPr lang="en-US" smtClean="0"/>
+              <a:rPr lang="en-US"/>
               <a:t>Second level</a:t>
             </a:r>
           </a:p>
           <a:p>
             <a:pPr lvl="2"/>
             <a:r>
-              <a:rPr lang="en-US" smtClean="0"/>
+              <a:rPr lang="en-US"/>
               <a:t>Third level</a:t>
             </a:r>
           </a:p>
           <a:p>
             <a:pPr lvl="3"/>
             <a:r>
-              <a:rPr lang="en-US" smtClean="0"/>
+              <a:rPr lang="en-US"/>
               <a:t>Fourth level</a:t>
             </a:r>
           </a:p>
           <a:p>
             <a:pPr lvl="4"/>
             <a:r>
-              <a:rPr lang="en-US" smtClean="0"/>
+              <a:rPr lang="en-US"/>
               <a:t>Fifth level</a:t>
             </a:r>
             <a:endParaRPr dirty="0"/>
@@ -3543,7 +3559,7 @@
           <a:p>
             <a:fld id="{B1115196-1C6F-4784-83AC-30756D8F10B3}" type="datetimeFigureOut">
               <a:rPr lang="en-US" smtClean="0"/>
-              <a:t>9/8/18</a:t>
+              <a:t>9/9/18</a:t>
             </a:fld>
             <a:endParaRPr lang="en-US"/>
           </a:p>
@@ -3633,7 +3649,7 @@
           <a:p>
             <a:fld id="{B1115196-1C6F-4784-83AC-30756D8F10B3}" type="datetimeFigureOut">
               <a:rPr lang="en-US" smtClean="0"/>
-              <a:t>9/8/18</a:t>
+              <a:t>9/9/18</a:t>
             </a:fld>
             <a:endParaRPr lang="en-US"/>
           </a:p>
@@ -3784,7 +3800,7 @@
           </a:lstStyle>
           <a:p>
             <a:r>
-              <a:rPr lang="en-US" smtClean="0"/>
+              <a:rPr lang="en-US"/>
               <a:t>Drag picture to placeholder or click icon to add</a:t>
             </a:r>
             <a:endParaRPr/>
@@ -4034,7 +4050,7 @@
           </a:lstStyle>
           <a:p>
             <a:r>
-              <a:rPr lang="en-US" smtClean="0"/>
+              <a:rPr lang="en-US"/>
               <a:t>Click to edit Master title style</a:t>
             </a:r>
             <a:endParaRPr/>
@@ -4156,7 +4172,7 @@
           </a:lstStyle>
           <a:p>
             <a:r>
-              <a:rPr lang="en-US" smtClean="0"/>
+              <a:rPr lang="en-US"/>
               <a:t>Click to edit Master subtitle style</a:t>
             </a:r>
             <a:endParaRPr dirty="0"/>
@@ -4496,7 +4512,7 @@
           </a:lstStyle>
           <a:p>
             <a:r>
-              <a:rPr lang="en-US" smtClean="0"/>
+              <a:rPr lang="en-US"/>
               <a:t>Click to edit Master title style</a:t>
             </a:r>
             <a:endParaRPr/>
@@ -4627,7 +4643,7 @@
           <a:p>
             <a:pPr lvl="0"/>
             <a:r>
-              <a:rPr lang="en-US" smtClean="0"/>
+              <a:rPr lang="en-US"/>
               <a:t>Click to edit Master text styles</a:t>
             </a:r>
           </a:p>
@@ -4655,7 +4671,7 @@
           <a:p>
             <a:fld id="{B1115196-1C6F-4784-83AC-30756D8F10B3}" type="datetimeFigureOut">
               <a:rPr lang="en-US" smtClean="0"/>
-              <a:t>9/8/18</a:t>
+              <a:t>9/9/18</a:t>
             </a:fld>
             <a:endParaRPr lang="en-US"/>
           </a:p>
@@ -5036,7 +5052,7 @@
           <a:lstStyle/>
           <a:p>
             <a:r>
-              <a:rPr lang="en-US" smtClean="0"/>
+              <a:rPr lang="en-US"/>
               <a:t>Click to edit Master title style</a:t>
             </a:r>
             <a:endParaRPr/>
@@ -5093,35 +5109,35 @@
           <a:p>
             <a:pPr lvl="0"/>
             <a:r>
-              <a:rPr lang="en-US" smtClean="0"/>
+              <a:rPr lang="en-US"/>
               <a:t>Click to edit Master text styles</a:t>
             </a:r>
           </a:p>
           <a:p>
             <a:pPr lvl="1"/>
             <a:r>
-              <a:rPr lang="en-US" smtClean="0"/>
+              <a:rPr lang="en-US"/>
               <a:t>Second level</a:t>
             </a:r>
           </a:p>
           <a:p>
             <a:pPr lvl="2"/>
             <a:r>
-              <a:rPr lang="en-US" smtClean="0"/>
+              <a:rPr lang="en-US"/>
               <a:t>Third level</a:t>
             </a:r>
           </a:p>
           <a:p>
             <a:pPr lvl="3"/>
             <a:r>
-              <a:rPr lang="en-US" smtClean="0"/>
+              <a:rPr lang="en-US"/>
               <a:t>Fourth level</a:t>
             </a:r>
           </a:p>
           <a:p>
             <a:pPr lvl="4"/>
             <a:r>
-              <a:rPr lang="en-US" smtClean="0"/>
+              <a:rPr lang="en-US"/>
               <a:t>Fifth level</a:t>
             </a:r>
             <a:endParaRPr dirty="0"/>
@@ -5178,35 +5194,35 @@
           <a:p>
             <a:pPr lvl="0"/>
             <a:r>
-              <a:rPr lang="en-US" smtClean="0"/>
+              <a:rPr lang="en-US"/>
               <a:t>Click to edit Master text styles</a:t>
             </a:r>
           </a:p>
           <a:p>
             <a:pPr lvl="1"/>
             <a:r>
-              <a:rPr lang="en-US" smtClean="0"/>
+              <a:rPr lang="en-US"/>
               <a:t>Second level</a:t>
             </a:r>
           </a:p>
           <a:p>
             <a:pPr lvl="2"/>
             <a:r>
-              <a:rPr lang="en-US" smtClean="0"/>
+              <a:rPr lang="en-US"/>
               <a:t>Third level</a:t>
             </a:r>
           </a:p>
           <a:p>
             <a:pPr lvl="3"/>
             <a:r>
-              <a:rPr lang="en-US" smtClean="0"/>
+              <a:rPr lang="en-US"/>
               <a:t>Fourth level</a:t>
             </a:r>
           </a:p>
           <a:p>
             <a:pPr lvl="4"/>
             <a:r>
-              <a:rPr lang="en-US" smtClean="0"/>
+              <a:rPr lang="en-US"/>
               <a:t>Fifth level</a:t>
             </a:r>
             <a:endParaRPr dirty="0"/>
@@ -5230,7 +5246,7 @@
           <a:p>
             <a:fld id="{B1115196-1C6F-4784-83AC-30756D8F10B3}" type="datetimeFigureOut">
               <a:rPr lang="en-US" smtClean="0"/>
-              <a:t>9/8/18</a:t>
+              <a:t>9/9/18</a:t>
             </a:fld>
             <a:endParaRPr lang="en-US"/>
           </a:p>
@@ -5346,7 +5362,7 @@
           </a:lstStyle>
           <a:p>
             <a:r>
-              <a:rPr lang="en-US" smtClean="0"/>
+              <a:rPr lang="en-US"/>
               <a:t>Click to edit Master title style</a:t>
             </a:r>
             <a:endParaRPr/>
@@ -5446,7 +5462,7 @@
           <a:p>
             <a:pPr lvl="0"/>
             <a:r>
-              <a:rPr lang="en-US" smtClean="0"/>
+              <a:rPr lang="en-US"/>
               <a:t>Click to edit Master text styles</a:t>
             </a:r>
           </a:p>
@@ -5502,35 +5518,35 @@
           <a:p>
             <a:pPr lvl="0"/>
             <a:r>
-              <a:rPr lang="en-US" smtClean="0"/>
+              <a:rPr lang="en-US"/>
               <a:t>Click to edit Master text styles</a:t>
             </a:r>
           </a:p>
           <a:p>
             <a:pPr lvl="1"/>
             <a:r>
-              <a:rPr lang="en-US" smtClean="0"/>
+              <a:rPr lang="en-US"/>
               <a:t>Second level</a:t>
             </a:r>
           </a:p>
           <a:p>
             <a:pPr lvl="2"/>
             <a:r>
-              <a:rPr lang="en-US" smtClean="0"/>
+              <a:rPr lang="en-US"/>
               <a:t>Third level</a:t>
             </a:r>
           </a:p>
           <a:p>
             <a:pPr lvl="3"/>
             <a:r>
-              <a:rPr lang="en-US" smtClean="0"/>
+              <a:rPr lang="en-US"/>
               <a:t>Fourth level</a:t>
             </a:r>
           </a:p>
           <a:p>
             <a:pPr lvl="4"/>
             <a:r>
-              <a:rPr lang="en-US" smtClean="0"/>
+              <a:rPr lang="en-US"/>
               <a:t>Fifth level</a:t>
             </a:r>
             <a:endParaRPr dirty="0"/>
@@ -5630,7 +5646,7 @@
           <a:p>
             <a:pPr lvl="0"/>
             <a:r>
-              <a:rPr lang="en-US" smtClean="0"/>
+              <a:rPr lang="en-US"/>
               <a:t>Click to edit Master text styles</a:t>
             </a:r>
           </a:p>
@@ -5686,35 +5702,35 @@
           <a:p>
             <a:pPr lvl="0"/>
             <a:r>
-              <a:rPr lang="en-US" smtClean="0"/>
+              <a:rPr lang="en-US"/>
               <a:t>Click to edit Master text styles</a:t>
             </a:r>
           </a:p>
           <a:p>
             <a:pPr lvl="1"/>
             <a:r>
-              <a:rPr lang="en-US" smtClean="0"/>
+              <a:rPr lang="en-US"/>
               <a:t>Second level</a:t>
             </a:r>
           </a:p>
           <a:p>
             <a:pPr lvl="2"/>
             <a:r>
-              <a:rPr lang="en-US" smtClean="0"/>
+              <a:rPr lang="en-US"/>
               <a:t>Third level</a:t>
             </a:r>
           </a:p>
           <a:p>
             <a:pPr lvl="3"/>
             <a:r>
-              <a:rPr lang="en-US" smtClean="0"/>
+              <a:rPr lang="en-US"/>
               <a:t>Fourth level</a:t>
             </a:r>
           </a:p>
           <a:p>
             <a:pPr lvl="4"/>
             <a:r>
-              <a:rPr lang="en-US" smtClean="0"/>
+              <a:rPr lang="en-US"/>
               <a:t>Fifth level</a:t>
             </a:r>
             <a:endParaRPr dirty="0"/>
@@ -5738,7 +5754,7 @@
           <a:p>
             <a:fld id="{B1115196-1C6F-4784-83AC-30756D8F10B3}" type="datetimeFigureOut">
               <a:rPr lang="en-US" smtClean="0"/>
-              <a:t>9/8/18</a:t>
+              <a:t>9/9/18</a:t>
             </a:fld>
             <a:endParaRPr lang="en-US"/>
           </a:p>
@@ -6134,7 +6150,7 @@
           </a:lstStyle>
           <a:p>
             <a:r>
-              <a:rPr lang="en-US" smtClean="0"/>
+              <a:rPr lang="en-US"/>
               <a:t>Click to edit Master title style</a:t>
             </a:r>
             <a:endParaRPr/>
@@ -6158,7 +6174,7 @@
           <a:p>
             <a:fld id="{B1115196-1C6F-4784-83AC-30756D8F10B3}" type="datetimeFigureOut">
               <a:rPr lang="en-US" smtClean="0"/>
-              <a:t>9/8/18</a:t>
+              <a:t>9/9/18</a:t>
             </a:fld>
             <a:endParaRPr lang="en-US"/>
           </a:p>
@@ -6522,7 +6538,7 @@
           <a:p>
             <a:fld id="{B1115196-1C6F-4784-83AC-30756D8F10B3}" type="datetimeFigureOut">
               <a:rPr lang="en-US" smtClean="0"/>
-              <a:t>9/8/18</a:t>
+              <a:t>9/9/18</a:t>
             </a:fld>
             <a:endParaRPr lang="en-US"/>
           </a:p>
@@ -6894,7 +6910,7 @@
           </a:lstStyle>
           <a:p>
             <a:r>
-              <a:rPr lang="en-US" smtClean="0"/>
+              <a:rPr lang="en-US"/>
               <a:t>Click to edit Master title style</a:t>
             </a:r>
             <a:endParaRPr/>
@@ -6951,35 +6967,35 @@
           <a:p>
             <a:pPr lvl="0"/>
             <a:r>
-              <a:rPr lang="en-US" smtClean="0"/>
+              <a:rPr lang="en-US"/>
               <a:t>Click to edit Master text styles</a:t>
             </a:r>
           </a:p>
           <a:p>
             <a:pPr lvl="1"/>
             <a:r>
-              <a:rPr lang="en-US" smtClean="0"/>
+              <a:rPr lang="en-US"/>
               <a:t>Second level</a:t>
             </a:r>
           </a:p>
           <a:p>
             <a:pPr lvl="2"/>
             <a:r>
-              <a:rPr lang="en-US" smtClean="0"/>
+              <a:rPr lang="en-US"/>
               <a:t>Third level</a:t>
             </a:r>
           </a:p>
           <a:p>
             <a:pPr lvl="3"/>
             <a:r>
-              <a:rPr lang="en-US" smtClean="0"/>
+              <a:rPr lang="en-US"/>
               <a:t>Fourth level</a:t>
             </a:r>
           </a:p>
           <a:p>
             <a:pPr lvl="4"/>
             <a:r>
-              <a:rPr lang="en-US" smtClean="0"/>
+              <a:rPr lang="en-US"/>
               <a:t>Fifth level</a:t>
             </a:r>
             <a:endParaRPr dirty="0"/>
@@ -7045,7 +7061,7 @@
           <a:p>
             <a:pPr lvl="0"/>
             <a:r>
-              <a:rPr lang="en-US" smtClean="0"/>
+              <a:rPr lang="en-US"/>
               <a:t>Click to edit Master text styles</a:t>
             </a:r>
           </a:p>
@@ -7068,7 +7084,7 @@
           <a:p>
             <a:fld id="{B1115196-1C6F-4784-83AC-30756D8F10B3}" type="datetimeFigureOut">
               <a:rPr lang="en-US" smtClean="0"/>
-              <a:t>9/8/18</a:t>
+              <a:t>9/9/18</a:t>
             </a:fld>
             <a:endParaRPr lang="en-US"/>
           </a:p>
@@ -7181,7 +7197,7 @@
           <a:p>
             <a:fld id="{B1115196-1C6F-4784-83AC-30756D8F10B3}" type="datetimeFigureOut">
               <a:rPr lang="en-US" smtClean="0"/>
-              <a:t>9/8/18</a:t>
+              <a:t>9/9/18</a:t>
             </a:fld>
             <a:endParaRPr lang="en-US"/>
           </a:p>
@@ -7213,7 +7229,7 @@
           <a:lstStyle/>
           <a:p>
             <a:r>
-              <a:rPr lang="en-US" smtClean="0"/>
+              <a:rPr lang="en-US"/>
               <a:t>Click to edit Master title style</a:t>
             </a:r>
             <a:endParaRPr/>
@@ -7247,35 +7263,35 @@
           <a:p>
             <a:pPr lvl="0"/>
             <a:r>
-              <a:rPr lang="en-US" smtClean="0"/>
+              <a:rPr lang="en-US"/>
               <a:t>Click to edit Master text styles</a:t>
             </a:r>
           </a:p>
           <a:p>
             <a:pPr lvl="1"/>
             <a:r>
-              <a:rPr lang="en-US" smtClean="0"/>
+              <a:rPr lang="en-US"/>
               <a:t>Second level</a:t>
             </a:r>
           </a:p>
           <a:p>
             <a:pPr lvl="2"/>
             <a:r>
-              <a:rPr lang="en-US" smtClean="0"/>
+              <a:rPr lang="en-US"/>
               <a:t>Third level</a:t>
             </a:r>
           </a:p>
           <a:p>
             <a:pPr lvl="3"/>
             <a:r>
-              <a:rPr lang="en-US" smtClean="0"/>
+              <a:rPr lang="en-US"/>
               <a:t>Fourth level</a:t>
             </a:r>
           </a:p>
           <a:p>
             <a:pPr lvl="4"/>
             <a:r>
-              <a:rPr lang="en-US" smtClean="0"/>
+              <a:rPr lang="en-US"/>
               <a:t>Fifth level</a:t>
             </a:r>
             <a:endParaRPr dirty="0"/>
@@ -7998,10 +8014,9 @@
           <a:lstStyle/>
           <a:p>
             <a:r>
-              <a:rPr lang="en-US" dirty="0" smtClean="0"/>
+              <a:rPr lang="en-US" dirty="0"/>
               <a:t>Inception Project  </a:t>
             </a:r>
-            <a:endParaRPr lang="en-US" dirty="0"/>
           </a:p>
         </p:txBody>
       </p:sp>
@@ -8021,18 +8036,17 @@
           <a:lstStyle/>
           <a:p>
             <a:r>
-              <a:rPr lang="en-US" dirty="0" smtClean="0"/>
+              <a:rPr lang="en-US" dirty="0"/>
               <a:t>Zach Gentry, </a:t>
             </a:r>
             <a:r>
-              <a:rPr lang="en-US" dirty="0" err="1" smtClean="0"/>
+              <a:rPr lang="en-US" dirty="0" err="1"/>
               <a:t>Tousar</a:t>
             </a:r>
             <a:r>
-              <a:rPr lang="en-US" dirty="0" smtClean="0"/>
+              <a:rPr lang="en-US" dirty="0"/>
               <a:t> Mohammed, Giannina Pachas, Courtney Howland</a:t>
             </a:r>
-            <a:endParaRPr lang="en-US" dirty="0"/>
           </a:p>
         </p:txBody>
       </p:sp>
@@ -8046,13 +8060,6 @@
   <p:clrMapOvr>
     <a:masterClrMapping/>
   </p:clrMapOvr>
-  <p:timing>
-    <p:tnLst>
-      <p:par>
-        <p:cTn xmlns:p14="http://schemas.microsoft.com/office/powerpoint/2010/main" id="1" dur="indefinite" restart="never" nodeType="tmRoot"/>
-      </p:par>
-    </p:tnLst>
-  </p:timing>
 </p:sld>
 </file>
 
@@ -8089,10 +8096,9 @@
           <a:lstStyle/>
           <a:p>
             <a:r>
-              <a:rPr lang="en-US" dirty="0" smtClean="0"/>
+              <a:rPr lang="en-US" dirty="0"/>
               <a:t>Tools</a:t>
             </a:r>
-            <a:endParaRPr lang="en-US" dirty="0"/>
           </a:p>
         </p:txBody>
       </p:sp>
@@ -8112,31 +8118,26 @@
           <a:lstStyle/>
           <a:p>
             <a:r>
-              <a:rPr lang="en-US" dirty="0" smtClean="0"/>
-              <a:t>React </a:t>
-            </a:r>
-            <a:r>
               <a:rPr lang="en-US" dirty="0"/>
-              <a:t>Native  </a:t>
-            </a:r>
-          </a:p>
-          <a:p>
-            <a:r>
-              <a:rPr lang="en-US" dirty="0" err="1" smtClean="0"/>
+              <a:t>React Native  </a:t>
+            </a:r>
+          </a:p>
+          <a:p>
+            <a:r>
+              <a:rPr lang="en-US" dirty="0" err="1"/>
               <a:t>Node.js</a:t>
             </a:r>
             <a:endParaRPr lang="en-US" dirty="0"/>
           </a:p>
           <a:p>
             <a:r>
-              <a:rPr lang="en-US" dirty="0" smtClean="0"/>
+              <a:rPr lang="en-US" dirty="0"/>
               <a:t>SQLite</a:t>
             </a:r>
-            <a:endParaRPr lang="en-US" dirty="0"/>
-          </a:p>
-          <a:p>
-            <a:r>
-              <a:rPr lang="en-US" dirty="0" err="1" smtClean="0"/>
+          </a:p>
+          <a:p>
+            <a:r>
+              <a:rPr lang="en-US" dirty="0" err="1"/>
               <a:t>openCVL</a:t>
             </a:r>
             <a:endParaRPr lang="en-US" dirty="0"/>
@@ -8172,13 +8173,6 @@
   <p:clrMapOvr>
     <a:masterClrMapping/>
   </p:clrMapOvr>
-  <p:timing>
-    <p:tnLst>
-      <p:par>
-        <p:cTn xmlns:p14="http://schemas.microsoft.com/office/powerpoint/2010/main" id="1" dur="indefinite" restart="never" nodeType="tmRoot"/>
-      </p:par>
-    </p:tnLst>
-  </p:timing>
 </p:sld>
 </file>
 
@@ -8215,10 +8209,9 @@
           <a:lstStyle/>
           <a:p>
             <a:r>
-              <a:rPr lang="en-US" dirty="0" smtClean="0"/>
+              <a:rPr lang="en-US" dirty="0"/>
               <a:t>People</a:t>
             </a:r>
-            <a:endParaRPr lang="en-US" dirty="0"/>
           </a:p>
         </p:txBody>
       </p:sp>
@@ -8238,27 +8231,27 @@
           <a:lstStyle/>
           <a:p>
             <a:r>
-              <a:rPr lang="en-US" dirty="0" smtClean="0"/>
+              <a:rPr lang="en-US" dirty="0"/>
               <a:t>Target audience</a:t>
             </a:r>
           </a:p>
           <a:p>
             <a:pPr lvl="1"/>
             <a:r>
-              <a:rPr lang="en-US" dirty="0" smtClean="0"/>
+              <a:rPr lang="en-US" dirty="0"/>
               <a:t>Kids ages 2+</a:t>
             </a:r>
           </a:p>
           <a:p>
             <a:r>
-              <a:rPr lang="en-US" dirty="0" smtClean="0"/>
+              <a:rPr lang="en-US" dirty="0"/>
               <a:t>Develop app</a:t>
             </a:r>
           </a:p>
           <a:p>
             <a:pPr lvl="1"/>
             <a:r>
-              <a:rPr lang="en-US" dirty="0" smtClean="0"/>
+              <a:rPr lang="en-US" dirty="0"/>
               <a:t>Us, Team 5</a:t>
             </a:r>
           </a:p>
@@ -8293,13 +8286,6 @@
   <p:clrMapOvr>
     <a:masterClrMapping/>
   </p:clrMapOvr>
-  <p:timing>
-    <p:tnLst>
-      <p:par>
-        <p:cTn xmlns:p14="http://schemas.microsoft.com/office/powerpoint/2010/main" id="1" dur="indefinite" restart="never" nodeType="tmRoot"/>
-      </p:par>
-    </p:tnLst>
-  </p:timing>
 </p:sld>
 </file>
 
@@ -8336,10 +8322,9 @@
           <a:lstStyle/>
           <a:p>
             <a:r>
-              <a:rPr lang="en-US" dirty="0" smtClean="0"/>
+              <a:rPr lang="en-US" dirty="0"/>
               <a:t>Education</a:t>
             </a:r>
-            <a:endParaRPr lang="en-US" dirty="0"/>
           </a:p>
         </p:txBody>
       </p:sp>
@@ -8359,22 +8344,14 @@
           <a:lstStyle/>
           <a:p>
             <a:r>
-              <a:rPr lang="en-US" dirty="0" smtClean="0"/>
-              <a:t>Beginners </a:t>
-            </a:r>
-            <a:r>
               <a:rPr lang="en-US" dirty="0"/>
-              <a:t>with app development  </a:t>
-            </a:r>
-          </a:p>
-          <a:p>
-            <a:r>
-              <a:rPr lang="en-US" dirty="0" smtClean="0"/>
-              <a:t>Upperclassmen </a:t>
-            </a:r>
+              <a:t>Beginners with app development  </a:t>
+            </a:r>
+          </a:p>
+          <a:p>
             <a:r>
               <a:rPr lang="en-US" dirty="0"/>
-              <a:t>software engineering students from UTA </a:t>
+              <a:t>Upperclassmen software engineering students from UTA </a:t>
             </a:r>
           </a:p>
         </p:txBody>
@@ -8408,13 +8385,6 @@
   <p:clrMapOvr>
     <a:masterClrMapping/>
   </p:clrMapOvr>
-  <p:timing>
-    <p:tnLst>
-      <p:par>
-        <p:cTn xmlns:p14="http://schemas.microsoft.com/office/powerpoint/2010/main" id="1" dur="indefinite" restart="never" nodeType="tmRoot"/>
-      </p:par>
-    </p:tnLst>
-  </p:timing>
 </p:sld>
 </file>
 
@@ -8451,10 +8421,9 @@
           <a:lstStyle/>
           <a:p>
             <a:r>
-              <a:rPr lang="en-US" dirty="0" smtClean="0"/>
+              <a:rPr lang="en-US" dirty="0"/>
               <a:t>Requirements</a:t>
             </a:r>
-            <a:endParaRPr lang="en-US" dirty="0"/>
           </a:p>
         </p:txBody>
       </p:sp>
@@ -8476,19 +8445,14 @@
           <a:lstStyle/>
           <a:p>
             <a:r>
-              <a:rPr lang="en-US" dirty="0" smtClean="0"/>
-              <a:t>5 </a:t>
-            </a:r>
-            <a:r>
               <a:rPr lang="en-US" dirty="0"/>
-              <a:t>lesson plans  </a:t>
-            </a:r>
-            <a:endParaRPr lang="en-US" dirty="0" smtClean="0"/>
+              <a:t>5 lesson plans  </a:t>
+            </a:r>
           </a:p>
           <a:p>
             <a:pPr lvl="1"/>
             <a:r>
-              <a:rPr lang="en-US" dirty="0" smtClean="0"/>
+              <a:rPr lang="en-US" dirty="0"/>
               <a:t>Letters (a-z)</a:t>
             </a:r>
           </a:p>
@@ -8496,78 +8460,40 @@
             <a:pPr lvl="1"/>
             <a:r>
               <a:rPr lang="en-US" dirty="0"/>
-              <a:t>N</a:t>
-            </a:r>
-            <a:r>
-              <a:rPr lang="en-US" dirty="0" smtClean="0"/>
-              <a:t>umber </a:t>
-            </a:r>
+              <a:t>Number (1-100)  </a:t>
+            </a:r>
+          </a:p>
+          <a:p>
+            <a:pPr lvl="1"/>
             <a:r>
               <a:rPr lang="en-US" dirty="0"/>
-              <a:t>(1-100)  </a:t>
-            </a:r>
-            <a:endParaRPr lang="en-US" dirty="0" smtClean="0"/>
+              <a:t>Shapes  </a:t>
+            </a:r>
           </a:p>
           <a:p>
             <a:pPr lvl="1"/>
             <a:r>
               <a:rPr lang="en-US" dirty="0"/>
-              <a:t>S</a:t>
-            </a:r>
-            <a:r>
-              <a:rPr lang="en-US" dirty="0" smtClean="0"/>
-              <a:t>hapes  </a:t>
-            </a:r>
-            <a:endParaRPr lang="en-US" dirty="0"/>
+              <a:t>Words (school words)  </a:t>
+            </a:r>
           </a:p>
           <a:p>
             <a:pPr lvl="1"/>
             <a:r>
               <a:rPr lang="en-US" dirty="0"/>
-              <a:t>W</a:t>
-            </a:r>
-            <a:r>
-              <a:rPr lang="en-US" dirty="0" smtClean="0"/>
-              <a:t>ords </a:t>
-            </a:r>
+              <a:t>Math (add, subtract)  </a:t>
+            </a:r>
+          </a:p>
+          <a:p>
             <a:r>
               <a:rPr lang="en-US" dirty="0"/>
-              <a:t>(school words)  </a:t>
-            </a:r>
-          </a:p>
-          <a:p>
-            <a:pPr lvl="1"/>
+              <a:t>SQLite database</a:t>
+            </a:r>
+          </a:p>
+          <a:p>
             <a:r>
               <a:rPr lang="en-US" dirty="0"/>
-              <a:t>M</a:t>
-            </a:r>
-            <a:r>
-              <a:rPr lang="en-US" dirty="0" smtClean="0"/>
-              <a:t>ath </a:t>
-            </a:r>
-            <a:r>
-              <a:rPr lang="en-US" dirty="0"/>
-              <a:t>(add, subtract)  </a:t>
-            </a:r>
-          </a:p>
-          <a:p>
-            <a:r>
-              <a:rPr lang="en-US" dirty="0" smtClean="0"/>
-              <a:t>SQLite </a:t>
-            </a:r>
-            <a:r>
-              <a:rPr lang="en-US" dirty="0"/>
-              <a:t>database</a:t>
-            </a:r>
-          </a:p>
-          <a:p>
-            <a:r>
-              <a:rPr lang="en-US" dirty="0" smtClean="0"/>
-              <a:t>Android </a:t>
-            </a:r>
-            <a:r>
-              <a:rPr lang="en-US" dirty="0"/>
-              <a:t>and </a:t>
+              <a:t>Android and </a:t>
             </a:r>
             <a:r>
               <a:rPr lang="en-US" dirty="0" err="1"/>
@@ -8577,32 +8503,20 @@
           </a:p>
           <a:p>
             <a:r>
-              <a:rPr lang="en-US" dirty="0" smtClean="0"/>
-              <a:t>Produces </a:t>
-            </a:r>
-            <a:r>
               <a:rPr lang="en-US" dirty="0"/>
-              <a:t>audio</a:t>
-            </a:r>
-          </a:p>
-          <a:p>
-            <a:r>
-              <a:rPr lang="en-US" dirty="0" smtClean="0"/>
-              <a:t>Capture </a:t>
-            </a:r>
+              <a:t>Produces audio</a:t>
+            </a:r>
+          </a:p>
+          <a:p>
             <a:r>
               <a:rPr lang="en-US" dirty="0"/>
-              <a:t>screen images</a:t>
-            </a:r>
-          </a:p>
-          <a:p>
-            <a:r>
-              <a:rPr lang="en-US" dirty="0" smtClean="0"/>
-              <a:t>Validates </a:t>
-            </a:r>
+              <a:t>Capture screen images</a:t>
+            </a:r>
+          </a:p>
+          <a:p>
             <a:r>
               <a:rPr lang="en-US" dirty="0"/>
-              <a:t>images for correctness</a:t>
+              <a:t>Validates images for correctness</a:t>
             </a:r>
           </a:p>
         </p:txBody>
@@ -8638,13 +8552,6 @@
   <p:clrMapOvr>
     <a:masterClrMapping/>
   </p:clrMapOvr>
-  <p:timing>
-    <p:tnLst>
-      <p:par>
-        <p:cTn xmlns:p14="http://schemas.microsoft.com/office/powerpoint/2010/main" id="1" dur="indefinite" restart="never" nodeType="tmRoot"/>
-      </p:par>
-    </p:tnLst>
-  </p:timing>
 </p:sld>
 </file>
 
@@ -8681,7 +8588,7 @@
           <a:lstStyle/>
           <a:p>
             <a:r>
-              <a:rPr lang="en-US" dirty="0" err="1" smtClean="0"/>
+              <a:rPr lang="en-US" dirty="0" err="1"/>
               <a:t>edU</a:t>
             </a:r>
             <a:endParaRPr lang="en-US" dirty="0"/>
@@ -8704,18 +8611,9 @@
           <a:lstStyle/>
           <a:p>
             <a:r>
-              <a:rPr lang="en-US" dirty="0" smtClean="0"/>
-              <a:t>Interactive educational </a:t>
-            </a:r>
-            <a:r>
               <a:rPr lang="en-US" dirty="0"/>
-              <a:t>a</a:t>
-            </a:r>
-            <a:r>
-              <a:rPr lang="en-US" dirty="0" smtClean="0"/>
-              <a:t>pp </a:t>
-            </a:r>
-            <a:endParaRPr lang="en-US" dirty="0"/>
+              <a:t>Interactive educational app </a:t>
+            </a:r>
           </a:p>
         </p:txBody>
       </p:sp>
@@ -8729,13 +8627,6 @@
   <p:clrMapOvr>
     <a:masterClrMapping/>
   </p:clrMapOvr>
-  <p:timing>
-    <p:tnLst>
-      <p:par>
-        <p:cTn xmlns:p14="http://schemas.microsoft.com/office/powerpoint/2010/main" id="1" dur="indefinite" restart="never" nodeType="tmRoot"/>
-      </p:par>
-    </p:tnLst>
-  </p:timing>
 </p:sld>
 </file>
 
@@ -8772,10 +8663,9 @@
           <a:lstStyle/>
           <a:p>
             <a:r>
-              <a:rPr lang="en-US" dirty="0" smtClean="0"/>
+              <a:rPr lang="en-US" dirty="0"/>
               <a:t>Project Vision</a:t>
             </a:r>
-            <a:endParaRPr lang="en-US" dirty="0"/>
           </a:p>
         </p:txBody>
       </p:sp>
@@ -8852,13 +8742,6 @@
   <p:clrMapOvr>
     <a:masterClrMapping/>
   </p:clrMapOvr>
-  <p:timing>
-    <p:tnLst>
-      <p:par>
-        <p:cTn xmlns:p14="http://schemas.microsoft.com/office/powerpoint/2010/main" id="1" dur="indefinite" restart="never" nodeType="tmRoot"/>
-      </p:par>
-    </p:tnLst>
-  </p:timing>
 </p:sld>
 </file>
 
@@ -8897,10 +8780,9 @@
           <a:lstStyle/>
           <a:p>
             <a:r>
-              <a:rPr lang="en-US" dirty="0" smtClean="0"/>
+              <a:rPr lang="en-US" dirty="0"/>
               <a:t>Top-3 Risk List</a:t>
             </a:r>
-            <a:endParaRPr lang="en-US" dirty="0"/>
           </a:p>
         </p:txBody>
       </p:sp>
@@ -8920,32 +8802,20 @@
           <a:lstStyle/>
           <a:p>
             <a:r>
-              <a:rPr lang="en-US" dirty="0" smtClean="0"/>
-              <a:t>Beginners </a:t>
-            </a:r>
-            <a:r>
               <a:rPr lang="en-US" dirty="0"/>
-              <a:t>to app development  </a:t>
-            </a:r>
-          </a:p>
-          <a:p>
-            <a:r>
-              <a:rPr lang="en-US" dirty="0" smtClean="0"/>
-              <a:t>Short </a:t>
-            </a:r>
+              <a:t>Beginners to app development  </a:t>
+            </a:r>
+          </a:p>
+          <a:p>
             <a:r>
               <a:rPr lang="en-US" dirty="0"/>
-              <a:t>duration to develop the full vision of the application  </a:t>
-            </a:r>
-          </a:p>
-          <a:p>
-            <a:r>
-              <a:rPr lang="en-US" dirty="0" smtClean="0"/>
-              <a:t>We </a:t>
-            </a:r>
+              <a:t>Short duration to develop the full vision of the application  </a:t>
+            </a:r>
+          </a:p>
+          <a:p>
             <a:r>
               <a:rPr lang="en-US" dirty="0"/>
-              <a:t>want to use </a:t>
+              <a:t>We want to use </a:t>
             </a:r>
             <a:r>
               <a:rPr lang="en-US" dirty="0" err="1"/>
@@ -8987,13 +8857,6 @@
   <p:clrMapOvr>
     <a:masterClrMapping/>
   </p:clrMapOvr>
-  <p:timing>
-    <p:tnLst>
-      <p:par>
-        <p:cTn xmlns:p14="http://schemas.microsoft.com/office/powerpoint/2010/main" id="1" dur="indefinite" restart="never" nodeType="tmRoot"/>
-      </p:par>
-    </p:tnLst>
-  </p:timing>
 </p:sld>
 </file>
 
@@ -9030,10 +8893,9 @@
           <a:lstStyle/>
           <a:p>
             <a:r>
-              <a:rPr lang="en-US" dirty="0" smtClean="0"/>
+              <a:rPr lang="en-US" dirty="0"/>
               <a:t>Competitors</a:t>
             </a:r>
-            <a:endParaRPr lang="en-US" dirty="0"/>
           </a:p>
         </p:txBody>
       </p:sp>
@@ -9047,48 +8909,64 @@
             <p:ph sz="half" idx="1"/>
           </p:nvPr>
         </p:nvSpPr>
-        <p:spPr/>
+        <p:spPr>
+          <a:xfrm>
+            <a:off x="752473" y="1600200"/>
+            <a:ext cx="7682609" cy="4525963"/>
+          </a:xfrm>
+        </p:spPr>
         <p:txBody>
           <a:bodyPr/>
           <a:lstStyle/>
           <a:p>
             <a:r>
-              <a:rPr lang="en-US" dirty="0" err="1" smtClean="0"/>
+              <a:rPr lang="en-US" dirty="0" err="1"/>
               <a:t>PocketPhonics</a:t>
             </a:r>
-            <a:endParaRPr lang="en-US" dirty="0" smtClean="0"/>
-          </a:p>
-          <a:p>
-            <a:r>
-              <a:rPr lang="en-US" dirty="0" smtClean="0"/>
-              <a:t>????</a:t>
-            </a:r>
-          </a:p>
-          <a:p>
-            <a:r>
-              <a:rPr lang="en-US" dirty="0" smtClean="0"/>
-              <a:t>????</a:t>
-            </a:r>
-          </a:p>
-          <a:p>
-            <a:endParaRPr lang="en-US" dirty="0" smtClean="0"/>
-          </a:p>
-        </p:txBody>
-      </p:sp>
-      <p:sp>
-        <p:nvSpPr>
-          <p:cNvPr id="4" name="Content Placeholder 3"/>
-          <p:cNvSpPr>
-            <a:spLocks noGrp="1"/>
-          </p:cNvSpPr>
-          <p:nvPr>
-            <p:ph sz="half" idx="2"/>
-          </p:nvPr>
-        </p:nvSpPr>
-        <p:spPr/>
-        <p:txBody>
-          <a:bodyPr/>
-          <a:lstStyle/>
+            <a:endParaRPr lang="en-US" dirty="0"/>
+          </a:p>
+          <a:p>
+            <a:pPr lvl="1"/>
+            <a:r>
+              <a:rPr lang="en-US" dirty="0"/>
+              <a:t>Is a learning app, that encourages the child to explore the alphabet by tracing the image of the letter. They also have an option of choosing the letter after hearing the corresponding audio.</a:t>
+            </a:r>
+          </a:p>
+          <a:p>
+            <a:r>
+              <a:rPr lang="en-US" dirty="0"/>
+              <a:t>Scribble Cards</a:t>
+            </a:r>
+          </a:p>
+          <a:p>
+            <a:pPr lvl="1"/>
+            <a:r>
+              <a:rPr lang="en-US" dirty="0"/>
+              <a:t>Scribble Cards is similar to </a:t>
+            </a:r>
+            <a:r>
+              <a:rPr lang="en-US" dirty="0" err="1"/>
+              <a:t>PocketPhonics</a:t>
+            </a:r>
+            <a:r>
+              <a:rPr lang="en-US" dirty="0"/>
+              <a:t>, but also incorporates numbers, as well as, the alphabet. Scribble Cards, on the other hand, does not include an audio learning feature.</a:t>
+            </a:r>
+          </a:p>
+          <a:p>
+            <a:r>
+              <a:rPr lang="en-US" dirty="0"/>
+              <a:t>Trace it, Try it</a:t>
+            </a:r>
+          </a:p>
+          <a:p>
+            <a:pPr lvl="1"/>
+            <a:r>
+              <a:rPr lang="en-US"/>
+              <a:t>Is a handwriting app that teaches children to trace over pre-drawn alphabets, numbers (0-20), and simple three letter words.</a:t>
+            </a:r>
+            <a:endParaRPr lang="en-US" dirty="0"/>
+          </a:p>
           <a:p>
             <a:endParaRPr lang="en-US" dirty="0"/>
           </a:p>
@@ -9104,13 +8982,6 @@
   <p:clrMapOvr>
     <a:masterClrMapping/>
   </p:clrMapOvr>
-  <p:timing>
-    <p:tnLst>
-      <p:par>
-        <p:cTn xmlns:p14="http://schemas.microsoft.com/office/powerpoint/2010/main" id="1" dur="indefinite" restart="never" nodeType="tmRoot"/>
-      </p:par>
-    </p:tnLst>
-  </p:timing>
 </p:sld>
 </file>
 
@@ -9147,10 +9018,9 @@
           <a:lstStyle/>
           <a:p>
             <a:r>
-              <a:rPr lang="en-US" dirty="0" smtClean="0"/>
+              <a:rPr lang="en-US" dirty="0"/>
               <a:t>Use Case</a:t>
             </a:r>
-            <a:endParaRPr lang="en-US" dirty="0"/>
           </a:p>
         </p:txBody>
       </p:sp>
@@ -9194,13 +9064,6 @@
   <p:clrMapOvr>
     <a:masterClrMapping/>
   </p:clrMapOvr>
-  <p:timing>
-    <p:tnLst>
-      <p:par>
-        <p:cTn xmlns:p14="http://schemas.microsoft.com/office/powerpoint/2010/main" id="1" dur="indefinite" restart="never" nodeType="tmRoot"/>
-      </p:par>
-    </p:tnLst>
-  </p:timing>
 </p:sld>
 </file>
 
@@ -9237,10 +9100,9 @@
           <a:lstStyle/>
           <a:p>
             <a:r>
-              <a:rPr lang="en-US" dirty="0" smtClean="0"/>
+              <a:rPr lang="en-US" dirty="0"/>
               <a:t>UI Layout</a:t>
             </a:r>
-            <a:endParaRPr lang="en-US" dirty="0"/>
           </a:p>
         </p:txBody>
       </p:sp>
@@ -9284,13 +9146,6 @@
   <p:clrMapOvr>
     <a:masterClrMapping/>
   </p:clrMapOvr>
-  <p:timing>
-    <p:tnLst>
-      <p:par>
-        <p:cTn xmlns:p14="http://schemas.microsoft.com/office/powerpoint/2010/main" id="1" dur="indefinite" restart="never" nodeType="tmRoot"/>
-      </p:par>
-    </p:tnLst>
-  </p:timing>
 </p:sld>
 </file>
 
@@ -9329,14 +9184,13 @@
           <a:lstStyle/>
           <a:p>
             <a:r>
-              <a:rPr lang="en-US" dirty="0" err="1" smtClean="0"/>
+              <a:rPr lang="en-US" dirty="0" err="1"/>
               <a:t>edU</a:t>
             </a:r>
             <a:r>
-              <a:rPr lang="en-US" dirty="0" smtClean="0"/>
+              <a:rPr lang="en-US" dirty="0"/>
               <a:t> Software Development Plan</a:t>
             </a:r>
-            <a:endParaRPr lang="en-US" dirty="0"/>
           </a:p>
         </p:txBody>
       </p:sp>
@@ -9369,13 +9223,6 @@
   <p:clrMapOvr>
     <a:masterClrMapping/>
   </p:clrMapOvr>
-  <p:timing>
-    <p:tnLst>
-      <p:par>
-        <p:cTn xmlns:p14="http://schemas.microsoft.com/office/powerpoint/2010/main" id="1" dur="indefinite" restart="never" nodeType="tmRoot"/>
-      </p:par>
-    </p:tnLst>
-  </p:timing>
 </p:sld>
 </file>
 
@@ -9412,10 +9259,9 @@
           <a:lstStyle/>
           <a:p>
             <a:r>
-              <a:rPr lang="en-US" dirty="0" smtClean="0"/>
+              <a:rPr lang="en-US" dirty="0"/>
               <a:t>Iteration Plans</a:t>
             </a:r>
-            <a:endParaRPr lang="en-US" dirty="0"/>
           </a:p>
         </p:txBody>
       </p:sp>
@@ -9438,123 +9284,66 @@
           <a:p>
             <a:r>
               <a:rPr lang="en-US" dirty="0"/>
-              <a:t>Iteration </a:t>
-            </a:r>
-            <a:r>
-              <a:rPr lang="en-US" dirty="0" smtClean="0"/>
-              <a:t>1</a:t>
+              <a:t>Iteration 1</a:t>
             </a:r>
           </a:p>
           <a:p>
             <a:pPr lvl="1"/>
             <a:r>
-              <a:rPr lang="en-US" dirty="0" smtClean="0"/>
-              <a:t>Testing </a:t>
-            </a:r>
-            <a:r>
               <a:rPr lang="en-US" dirty="0"/>
-              <a:t>tools (single word test</a:t>
-            </a:r>
-            <a:r>
-              <a:rPr lang="en-US" dirty="0" smtClean="0"/>
-              <a:t>)</a:t>
+              <a:t>Testing tools (single word test)</a:t>
             </a:r>
           </a:p>
           <a:p>
             <a:pPr lvl="2"/>
             <a:r>
               <a:rPr lang="en-US" dirty="0"/>
-              <a:t>A</a:t>
-            </a:r>
-            <a:r>
-              <a:rPr lang="en-US" dirty="0" smtClean="0"/>
-              <a:t>ble </a:t>
-            </a:r>
+              <a:t>Able to draw images</a:t>
+            </a:r>
+          </a:p>
+          <a:p>
+            <a:pPr lvl="2"/>
             <a:r>
               <a:rPr lang="en-US" dirty="0"/>
-              <a:t>to draw </a:t>
-            </a:r>
-            <a:r>
-              <a:rPr lang="en-US" dirty="0" smtClean="0"/>
-              <a:t>images</a:t>
+              <a:t>Audio works</a:t>
             </a:r>
           </a:p>
           <a:p>
             <a:pPr lvl="2"/>
             <a:r>
-              <a:rPr lang="en-US" dirty="0" smtClean="0"/>
-              <a:t>Audio works</a:t>
-            </a:r>
+              <a:rPr lang="en-US" dirty="0"/>
+              <a:t>Successfully validate drawn words</a:t>
+            </a:r>
+          </a:p>
+          <a:p>
+            <a:r>
+              <a:rPr lang="en-US" dirty="0"/>
+              <a:t>Iteration 2</a:t>
+            </a:r>
+            <a:endParaRPr lang="en-US" sz="1600" dirty="0"/>
+          </a:p>
+          <a:p>
+            <a:pPr lvl="1"/>
+            <a:r>
+              <a:rPr lang="en-US" dirty="0"/>
+              <a:t>Create UI</a:t>
+            </a:r>
+            <a:endParaRPr lang="en-US" sz="1600" dirty="0"/>
+          </a:p>
+          <a:p>
+            <a:pPr lvl="1"/>
+            <a:r>
+              <a:rPr lang="en-US" dirty="0"/>
+              <a:t>Setup database</a:t>
+            </a:r>
+            <a:endParaRPr lang="en-US" sz="1600" dirty="0"/>
           </a:p>
           <a:p>
             <a:pPr lvl="2"/>
             <a:r>
               <a:rPr lang="en-US" dirty="0"/>
-              <a:t>S</a:t>
-            </a:r>
-            <a:r>
-              <a:rPr lang="en-US" dirty="0" smtClean="0"/>
-              <a:t>uccessfully </a:t>
-            </a:r>
-            <a:r>
-              <a:rPr lang="en-US" dirty="0"/>
-              <a:t>validate drawn </a:t>
-            </a:r>
-            <a:r>
-              <a:rPr lang="en-US" dirty="0" smtClean="0"/>
-              <a:t>words</a:t>
-            </a:r>
-          </a:p>
-          <a:p>
-            <a:r>
-              <a:rPr lang="en-US" dirty="0" smtClean="0"/>
-              <a:t>Iteration </a:t>
-            </a:r>
-            <a:r>
-              <a:rPr lang="en-US" dirty="0"/>
-              <a:t>2</a:t>
-            </a:r>
-            <a:endParaRPr lang="en-US" sz="1600" dirty="0"/>
-          </a:p>
-          <a:p>
-            <a:pPr lvl="1"/>
-            <a:r>
-              <a:rPr lang="en-US" dirty="0" smtClean="0"/>
-              <a:t>Create </a:t>
-            </a:r>
-            <a:r>
-              <a:rPr lang="en-US" dirty="0"/>
-              <a:t>UI</a:t>
-            </a:r>
-            <a:endParaRPr lang="en-US" sz="1600" dirty="0"/>
-          </a:p>
-          <a:p>
-            <a:pPr lvl="1"/>
-            <a:r>
-              <a:rPr lang="en-US" dirty="0" smtClean="0"/>
-              <a:t>Setup </a:t>
-            </a:r>
-            <a:r>
-              <a:rPr lang="en-US" dirty="0"/>
-              <a:t>database</a:t>
-            </a:r>
-            <a:endParaRPr lang="en-US" sz="1600" dirty="0"/>
-          </a:p>
-          <a:p>
-            <a:pPr lvl="2"/>
-            <a:r>
-              <a:rPr lang="en-US" dirty="0"/>
-              <a:t>P</a:t>
-            </a:r>
-            <a:r>
-              <a:rPr lang="en-US" dirty="0" smtClean="0"/>
-              <a:t>opulate </a:t>
-            </a:r>
-            <a:r>
-              <a:rPr lang="en-US" dirty="0"/>
-              <a:t>database</a:t>
-            </a:r>
-            <a:endParaRPr lang="en-US" dirty="0" smtClean="0"/>
+              <a:t>Populate database</a:t>
+            </a:r>
           </a:p>
         </p:txBody>
       </p:sp>
@@ -9577,53 +9366,33 @@
           <a:p>
             <a:r>
               <a:rPr lang="en-US" dirty="0"/>
-              <a:t>Iteration </a:t>
-            </a:r>
-            <a:r>
-              <a:rPr lang="en-US" dirty="0" smtClean="0"/>
-              <a:t>3</a:t>
+              <a:t>Iteration 3</a:t>
             </a:r>
           </a:p>
           <a:p>
             <a:pPr lvl="1"/>
             <a:r>
-              <a:rPr lang="en-US" dirty="0" smtClean="0"/>
-              <a:t>Create </a:t>
-            </a:r>
-            <a:r>
               <a:rPr lang="en-US" dirty="0"/>
-              <a:t>lessons based on data from </a:t>
-            </a:r>
-            <a:r>
-              <a:rPr lang="en-US" dirty="0" smtClean="0"/>
-              <a:t>database</a:t>
+              <a:t>Create lessons based on data from database</a:t>
             </a:r>
           </a:p>
           <a:p>
             <a:pPr lvl="1"/>
             <a:r>
-              <a:rPr lang="en-US" dirty="0" smtClean="0"/>
-              <a:t>Test </a:t>
-            </a:r>
-            <a:r>
               <a:rPr lang="en-US" dirty="0"/>
-              <a:t>5 lessons in </a:t>
-            </a:r>
-            <a:r>
-              <a:rPr lang="en-US" dirty="0" smtClean="0"/>
-              <a:t>app</a:t>
-            </a:r>
-          </a:p>
-          <a:p>
-            <a:r>
-              <a:rPr lang="en-US" dirty="0" smtClean="0"/>
+              <a:t>Test 5 lessons in app</a:t>
+            </a:r>
+          </a:p>
+          <a:p>
+            <a:r>
+              <a:rPr lang="en-US" dirty="0"/>
               <a:t>Final Deliverable</a:t>
             </a:r>
           </a:p>
           <a:p>
             <a:pPr lvl="1"/>
             <a:r>
-              <a:rPr lang="en-US" dirty="0" smtClean="0"/>
+              <a:rPr lang="en-US" dirty="0"/>
               <a:t>Final product</a:t>
             </a:r>
             <a:endParaRPr lang="en-US" sz="1600" dirty="0"/>
@@ -9631,7 +9400,7 @@
           <a:p>
             <a:pPr lvl="1"/>
             <a:r>
-              <a:rPr lang="en-US" dirty="0" smtClean="0"/>
+              <a:rPr lang="en-US" dirty="0"/>
               <a:t>Future plans</a:t>
             </a:r>
             <a:endParaRPr lang="en-US" sz="1600" dirty="0"/>
@@ -9639,12 +9408,8 @@
           <a:p>
             <a:pPr lvl="1"/>
             <a:r>
-              <a:rPr lang="en-US" dirty="0" smtClean="0"/>
-              <a:t>Polish </a:t>
-            </a:r>
-            <a:r>
               <a:rPr lang="en-US" dirty="0"/>
-              <a:t>application</a:t>
+              <a:t>Polish application</a:t>
             </a:r>
           </a:p>
         </p:txBody>
@@ -9659,13 +9424,6 @@
   <p:clrMapOvr>
     <a:masterClrMapping/>
   </p:clrMapOvr>
-  <p:timing>
-    <p:tnLst>
-      <p:par>
-        <p:cTn xmlns:p14="http://schemas.microsoft.com/office/powerpoint/2010/main" id="1" dur="indefinite" restart="never" nodeType="tmRoot"/>
-      </p:par>
-    </p:tnLst>
-  </p:timing>
 </p:sld>
 </file>
 

</xml_diff>